<commit_message>
Updating Presentation - typo fix
</commit_message>
<xml_diff>
--- a/HorrorscopesFinal.pptx
+++ b/HorrorscopesFinal.pptx
@@ -12234,7 +12234,7 @@
                 <a:cs typeface="Times New Roman"/>
                 <a:sym typeface="Times New Roman"/>
               </a:rPr>
-              <a:t>Unfortunately, both models showed aa low accuracy score as well as precision, recall and F1 scores.</a:t>
+              <a:t>Unfortunately, both models showed a low accuracy score as well as precision, recall and F1 scores.</a:t>
             </a:r>
             <a:endParaRPr>
               <a:solidFill>
@@ -12737,7 +12737,7 @@
                 <a:cs typeface="Times New Roman"/>
                 <a:sym typeface="Times New Roman"/>
               </a:rPr>
-              <a:t>Question: Does Crime happen more often during full moons?</a:t>
+              <a:t>Question: Does Crime happen more often during certain astrological seasons?</a:t>
             </a:r>
             <a:endParaRPr>
               <a:solidFill>
@@ -12797,7 +12797,7 @@
                 <a:cs typeface="Times New Roman"/>
                 <a:sym typeface="Times New Roman"/>
               </a:rPr>
-              <a:t>Answer: The results in the Classification Report for the KC Crime Dataset show that our Logistic Regression model CANNOT accurately predict the answers we were looking for on this data set. Crime does not occur more often during full moons.</a:t>
+              <a:t>Answer: The results in the Classification Report for the KC Crime Dataset show that our Logistic Regression model CANNOT accurately predict the answers we were looking for on this data set. Crime does not occur more often during a certain astrological season.</a:t>
             </a:r>
             <a:endParaRPr>
               <a:solidFill>

</xml_diff>